<commit_message>
changed distraction task video and image backup to reflect 20s display and 4 rounds.
</commit_message>
<xml_diff>
--- a/offline/DistractionTask/Video/DistractionTaskInstructions.pptx
+++ b/offline/DistractionTask/Video/DistractionTaskInstructions.pptx
@@ -116,6 +116,11 @@
       </a:defRPr>
     </a:lvl9pPr>
   </p:defaultTextStyle>
+  <p:extLst>
+    <p:ext uri="{EFAFB233-063F-42B5-8137-9DF3F51BA10A}">
+      <p15:sldGuideLst xmlns:p15="http://schemas.microsoft.com/office/powerpoint/2012/main"/>
+    </p:ext>
+  </p:extLst>
 </p:presentation>
 </file>
 
@@ -250,7 +255,7 @@
           <a:p>
             <a:fld id="{FED3A9A3-8860-AF43-94A6-71779EA504AF}" type="datetimeFigureOut">
               <a:rPr lang="en-US" smtClean="0"/>
-              <a:t>7/12/17</a:t>
+              <a:t>7/26/17</a:t>
             </a:fld>
             <a:endParaRPr lang="en-US"/>
           </a:p>
@@ -420,7 +425,7 @@
           <a:p>
             <a:fld id="{FED3A9A3-8860-AF43-94A6-71779EA504AF}" type="datetimeFigureOut">
               <a:rPr lang="en-US" smtClean="0"/>
-              <a:t>7/12/17</a:t>
+              <a:t>7/26/17</a:t>
             </a:fld>
             <a:endParaRPr lang="en-US"/>
           </a:p>
@@ -600,7 +605,7 @@
           <a:p>
             <a:fld id="{FED3A9A3-8860-AF43-94A6-71779EA504AF}" type="datetimeFigureOut">
               <a:rPr lang="en-US" smtClean="0"/>
-              <a:t>7/12/17</a:t>
+              <a:t>7/26/17</a:t>
             </a:fld>
             <a:endParaRPr lang="en-US"/>
           </a:p>
@@ -770,7 +775,7 @@
           <a:p>
             <a:fld id="{FED3A9A3-8860-AF43-94A6-71779EA504AF}" type="datetimeFigureOut">
               <a:rPr lang="en-US" smtClean="0"/>
-              <a:t>7/12/17</a:t>
+              <a:t>7/26/17</a:t>
             </a:fld>
             <a:endParaRPr lang="en-US"/>
           </a:p>
@@ -1016,7 +1021,7 @@
           <a:p>
             <a:fld id="{FED3A9A3-8860-AF43-94A6-71779EA504AF}" type="datetimeFigureOut">
               <a:rPr lang="en-US" smtClean="0"/>
-              <a:t>7/12/17</a:t>
+              <a:t>7/26/17</a:t>
             </a:fld>
             <a:endParaRPr lang="en-US"/>
           </a:p>
@@ -1248,7 +1253,7 @@
           <a:p>
             <a:fld id="{FED3A9A3-8860-AF43-94A6-71779EA504AF}" type="datetimeFigureOut">
               <a:rPr lang="en-US" smtClean="0"/>
-              <a:t>7/12/17</a:t>
+              <a:t>7/26/17</a:t>
             </a:fld>
             <a:endParaRPr lang="en-US"/>
           </a:p>
@@ -1615,7 +1620,7 @@
           <a:p>
             <a:fld id="{FED3A9A3-8860-AF43-94A6-71779EA504AF}" type="datetimeFigureOut">
               <a:rPr lang="en-US" smtClean="0"/>
-              <a:t>7/12/17</a:t>
+              <a:t>7/26/17</a:t>
             </a:fld>
             <a:endParaRPr lang="en-US"/>
           </a:p>
@@ -1733,7 +1738,7 @@
           <a:p>
             <a:fld id="{FED3A9A3-8860-AF43-94A6-71779EA504AF}" type="datetimeFigureOut">
               <a:rPr lang="en-US" smtClean="0"/>
-              <a:t>7/12/17</a:t>
+              <a:t>7/26/17</a:t>
             </a:fld>
             <a:endParaRPr lang="en-US"/>
           </a:p>
@@ -1828,7 +1833,7 @@
           <a:p>
             <a:fld id="{FED3A9A3-8860-AF43-94A6-71779EA504AF}" type="datetimeFigureOut">
               <a:rPr lang="en-US" smtClean="0"/>
-              <a:t>7/12/17</a:t>
+              <a:t>7/26/17</a:t>
             </a:fld>
             <a:endParaRPr lang="en-US"/>
           </a:p>
@@ -2105,7 +2110,7 @@
           <a:p>
             <a:fld id="{FED3A9A3-8860-AF43-94A6-71779EA504AF}" type="datetimeFigureOut">
               <a:rPr lang="en-US" smtClean="0"/>
-              <a:t>7/12/17</a:t>
+              <a:t>7/26/17</a:t>
             </a:fld>
             <a:endParaRPr lang="en-US"/>
           </a:p>
@@ -2358,7 +2363,7 @@
           <a:p>
             <a:fld id="{FED3A9A3-8860-AF43-94A6-71779EA504AF}" type="datetimeFigureOut">
               <a:rPr lang="en-US" smtClean="0"/>
-              <a:t>7/12/17</a:t>
+              <a:t>7/26/17</a:t>
             </a:fld>
             <a:endParaRPr lang="en-US"/>
           </a:p>
@@ -2571,7 +2576,7 @@
           <a:p>
             <a:fld id="{FED3A9A3-8860-AF43-94A6-71779EA504AF}" type="datetimeFigureOut">
               <a:rPr lang="en-US" smtClean="0"/>
-              <a:t>7/12/17</a:t>
+              <a:t>7/26/17</a:t>
             </a:fld>
             <a:endParaRPr lang="en-US"/>
           </a:p>
@@ -2986,11 +2991,11 @@
   <p:clrMapOvr>
     <a:masterClrMapping/>
   </p:clrMapOvr>
-  <mc:AlternateContent xmlns:mc="http://schemas.openxmlformats.org/markup-compatibility/2006">
-    <mc:Choice xmlns:p14="http://schemas.microsoft.com/office/powerpoint/2010/main" Requires="p14">
+  <mc:AlternateContent xmlns:mc="http://schemas.openxmlformats.org/markup-compatibility/2006" xmlns:p14="http://schemas.microsoft.com/office/powerpoint/2010/main">
+    <mc:Choice Requires="p14">
       <p:transition spd="slow" p14:dur="2000" advTm="1850"/>
     </mc:Choice>
-    <mc:Fallback>
+    <mc:Fallback xmlns="">
       <p:transition spd="slow" advTm="1850"/>
     </mc:Fallback>
   </mc:AlternateContent>
@@ -3450,11 +3455,11 @@
   <p:clrMapOvr>
     <a:masterClrMapping/>
   </p:clrMapOvr>
-  <mc:AlternateContent xmlns:mc="http://schemas.openxmlformats.org/markup-compatibility/2006">
-    <mc:Choice xmlns:p14="http://schemas.microsoft.com/office/powerpoint/2010/main" Requires="p14">
+  <mc:AlternateContent xmlns:mc="http://schemas.openxmlformats.org/markup-compatibility/2006" xmlns:p14="http://schemas.microsoft.com/office/powerpoint/2010/main">
+    <mc:Choice Requires="p14">
       <p:transition spd="slow" p14:dur="2000" advTm="13685"/>
     </mc:Choice>
-    <mc:Fallback>
+    <mc:Fallback xmlns="">
       <p:transition spd="slow" advTm="13685"/>
     </mc:Fallback>
   </mc:AlternateContent>
@@ -4083,11 +4088,11 @@
   <p:clrMapOvr>
     <a:masterClrMapping/>
   </p:clrMapOvr>
-  <mc:AlternateContent xmlns:mc="http://schemas.openxmlformats.org/markup-compatibility/2006">
-    <mc:Choice xmlns:p14="http://schemas.microsoft.com/office/powerpoint/2010/main" Requires="p14">
+  <mc:AlternateContent xmlns:mc="http://schemas.openxmlformats.org/markup-compatibility/2006" xmlns:p14="http://schemas.microsoft.com/office/powerpoint/2010/main">
+    <mc:Choice Requires="p14">
       <p:transition spd="slow" p14:dur="2000" advTm="6547"/>
     </mc:Choice>
-    <mc:Fallback>
+    <mc:Fallback xmlns="">
       <p:transition spd="slow" advTm="6547"/>
     </mc:Fallback>
   </mc:AlternateContent>
@@ -4216,7 +4221,15 @@
             <a:pPr algn="ctr"/>
             <a:r>
               <a:rPr lang="en-US" sz="5400" b="1" dirty="0" smtClean="0"/>
-              <a:t>You will play 3 rounds of the game.</a:t>
+              <a:t>You will play </a:t>
+            </a:r>
+            <a:r>
+              <a:rPr lang="en-US" sz="5400" b="1" dirty="0" smtClean="0"/>
+              <a:t>4 </a:t>
+            </a:r>
+            <a:r>
+              <a:rPr lang="en-US" sz="5400" b="1" dirty="0" smtClean="0"/>
+              <a:t>rounds of the game.</a:t>
             </a:r>
             <a:br>
               <a:rPr lang="en-US" sz="5400" b="1" dirty="0" smtClean="0"/>
@@ -4297,13 +4310,13 @@
   <p:clrMapOvr>
     <a:masterClrMapping/>
   </p:clrMapOvr>
-  <mc:AlternateContent xmlns:mc="http://schemas.openxmlformats.org/markup-compatibility/2006">
-    <mc:Choice xmlns:p14="http://schemas.microsoft.com/office/powerpoint/2010/main" Requires="p14">
+  <mc:AlternateContent xmlns:mc="http://schemas.openxmlformats.org/markup-compatibility/2006" xmlns:p14="http://schemas.microsoft.com/office/powerpoint/2010/main">
+    <mc:Choice Requires="p14">
       <p:transition spd="med" p14:dur="700" advTm="6834">
         <p:fade/>
       </p:transition>
     </mc:Choice>
-    <mc:Fallback>
+    <mc:Fallback xmlns="">
       <p:transition spd="med" advTm="6834">
         <p:fade/>
       </p:transition>
@@ -4450,13 +4463,13 @@
   <p:clrMapOvr>
     <a:masterClrMapping/>
   </p:clrMapOvr>
-  <mc:AlternateContent xmlns:mc="http://schemas.openxmlformats.org/markup-compatibility/2006">
-    <mc:Choice xmlns:p14="http://schemas.microsoft.com/office/powerpoint/2010/main" Requires="p14">
+  <mc:AlternateContent xmlns:mc="http://schemas.openxmlformats.org/markup-compatibility/2006" xmlns:p14="http://schemas.microsoft.com/office/powerpoint/2010/main">
+    <mc:Choice Requires="p14">
       <p:transition spd="med" p14:dur="700" advTm="4801">
         <p:fade/>
       </p:transition>
     </mc:Choice>
-    <mc:Fallback>
+    <mc:Fallback xmlns="">
       <p:transition spd="med" advTm="4801">
         <p:fade/>
       </p:transition>
@@ -4603,13 +4616,13 @@
   <p:clrMapOvr>
     <a:masterClrMapping/>
   </p:clrMapOvr>
-  <mc:AlternateContent xmlns:mc="http://schemas.openxmlformats.org/markup-compatibility/2006">
-    <mc:Choice xmlns:p14="http://schemas.microsoft.com/office/powerpoint/2010/main" Requires="p14">
+  <mc:AlternateContent xmlns:mc="http://schemas.openxmlformats.org/markup-compatibility/2006" xmlns:p14="http://schemas.microsoft.com/office/powerpoint/2010/main">
+    <mc:Choice Requires="p14">
       <p:transition spd="med" p14:dur="700" advTm="4143">
         <p:fade/>
       </p:transition>
     </mc:Choice>
-    <mc:Fallback>
+    <mc:Fallback xmlns="">
       <p:transition spd="med" advTm="4143">
         <p:fade/>
       </p:transition>
@@ -4988,13 +5001,13 @@
   <p:clrMapOvr>
     <a:masterClrMapping/>
   </p:clrMapOvr>
-  <mc:AlternateContent xmlns:mc="http://schemas.openxmlformats.org/markup-compatibility/2006">
-    <mc:Choice xmlns:p14="http://schemas.microsoft.com/office/powerpoint/2010/main" Requires="p14">
+  <mc:AlternateContent xmlns:mc="http://schemas.openxmlformats.org/markup-compatibility/2006" xmlns:p14="http://schemas.microsoft.com/office/powerpoint/2010/main">
+    <mc:Choice Requires="p14">
       <p:transition spd="med" p14:dur="700" advTm="9072">
         <p:fade/>
       </p:transition>
     </mc:Choice>
-    <mc:Fallback>
+    <mc:Fallback xmlns="">
       <p:transition spd="med" advTm="9072">
         <p:fade/>
       </p:transition>
@@ -5560,11 +5573,11 @@
   <p:clrMapOvr>
     <a:masterClrMapping/>
   </p:clrMapOvr>
-  <mc:AlternateContent xmlns:mc="http://schemas.openxmlformats.org/markup-compatibility/2006">
-    <mc:Choice xmlns:p14="http://schemas.microsoft.com/office/powerpoint/2010/main" Requires="p14">
+  <mc:AlternateContent xmlns:mc="http://schemas.openxmlformats.org/markup-compatibility/2006" xmlns:p14="http://schemas.microsoft.com/office/powerpoint/2010/main">
+    <mc:Choice Requires="p14">
       <p:transition spd="slow" p14:dur="2000" advTm="4603"/>
     </mc:Choice>
-    <mc:Fallback>
+    <mc:Fallback xmlns="">
       <p:transition spd="slow" advTm="4603"/>
     </mc:Fallback>
   </mc:AlternateContent>
@@ -5686,7 +5699,15 @@
             <a:pPr algn="ctr"/>
             <a:r>
               <a:rPr lang="en-US" b="1" dirty="0" smtClean="0"/>
-              <a:t>You have 30 seconds to </a:t>
+              <a:t>You have </a:t>
+            </a:r>
+            <a:r>
+              <a:rPr lang="en-US" b="1" dirty="0" smtClean="0"/>
+              <a:t>20 </a:t>
+            </a:r>
+            <a:r>
+              <a:rPr lang="en-US" b="1" dirty="0" smtClean="0"/>
+              <a:t>seconds to </a:t>
             </a:r>
             <a:r>
               <a:rPr lang="en-US" b="1" dirty="0" err="1" smtClean="0"/>
@@ -5947,11 +5968,11 @@
   <p:clrMapOvr>
     <a:masterClrMapping/>
   </p:clrMapOvr>
-  <mc:AlternateContent xmlns:mc="http://schemas.openxmlformats.org/markup-compatibility/2006">
-    <mc:Choice xmlns:p14="http://schemas.microsoft.com/office/powerpoint/2010/main" Requires="p14">
+  <mc:AlternateContent xmlns:mc="http://schemas.openxmlformats.org/markup-compatibility/2006" xmlns:p14="http://schemas.microsoft.com/office/powerpoint/2010/main">
+    <mc:Choice Requires="p14">
       <p:transition spd="slow" p14:dur="2000" advTm="7874"/>
     </mc:Choice>
-    <mc:Fallback>
+    <mc:Fallback xmlns="">
       <p:transition spd="slow" advTm="7874"/>
     </mc:Fallback>
   </mc:AlternateContent>
@@ -6369,11 +6390,11 @@
   <p:clrMapOvr>
     <a:masterClrMapping/>
   </p:clrMapOvr>
-  <mc:AlternateContent xmlns:mc="http://schemas.openxmlformats.org/markup-compatibility/2006">
-    <mc:Choice xmlns:p14="http://schemas.microsoft.com/office/powerpoint/2010/main" Requires="p14">
+  <mc:AlternateContent xmlns:mc="http://schemas.openxmlformats.org/markup-compatibility/2006" xmlns:p14="http://schemas.microsoft.com/office/powerpoint/2010/main">
+    <mc:Choice Requires="p14">
       <p:transition spd="slow" p14:dur="2000" advTm="7468"/>
     </mc:Choice>
-    <mc:Fallback>
+    <mc:Fallback xmlns="">
       <p:transition spd="slow" advTm="7468"/>
     </mc:Fallback>
   </mc:AlternateContent>
@@ -6762,11 +6783,11 @@
   <p:clrMapOvr>
     <a:masterClrMapping/>
   </p:clrMapOvr>
-  <mc:AlternateContent xmlns:mc="http://schemas.openxmlformats.org/markup-compatibility/2006">
-    <mc:Choice xmlns:p14="http://schemas.microsoft.com/office/powerpoint/2010/main" Requires="p14">
+  <mc:AlternateContent xmlns:mc="http://schemas.openxmlformats.org/markup-compatibility/2006" xmlns:p14="http://schemas.microsoft.com/office/powerpoint/2010/main">
+    <mc:Choice Requires="p14">
       <p:transition spd="slow" p14:dur="2000" advTm="12634"/>
     </mc:Choice>
-    <mc:Fallback>
+    <mc:Fallback xmlns="">
       <p:transition spd="slow" advTm="12634"/>
     </mc:Fallback>
   </mc:AlternateContent>
@@ -7495,11 +7516,11 @@
   <p:clrMapOvr>
     <a:masterClrMapping/>
   </p:clrMapOvr>
-  <mc:AlternateContent xmlns:mc="http://schemas.openxmlformats.org/markup-compatibility/2006">
-    <mc:Choice xmlns:p14="http://schemas.microsoft.com/office/powerpoint/2010/main" Requires="p14">
+  <mc:AlternateContent xmlns:mc="http://schemas.openxmlformats.org/markup-compatibility/2006" xmlns:p14="http://schemas.microsoft.com/office/powerpoint/2010/main">
+    <mc:Choice Requires="p14">
       <p:transition spd="slow" p14:dur="2000" advTm="11973"/>
     </mc:Choice>
-    <mc:Fallback>
+    <mc:Fallback xmlns="">
       <p:transition spd="slow" advTm="11973"/>
     </mc:Fallback>
   </mc:AlternateContent>
@@ -8256,11 +8277,11 @@
   <p:clrMapOvr>
     <a:masterClrMapping/>
   </p:clrMapOvr>
-  <mc:AlternateContent xmlns:mc="http://schemas.openxmlformats.org/markup-compatibility/2006">
-    <mc:Choice xmlns:p14="http://schemas.microsoft.com/office/powerpoint/2010/main" Requires="p14">
+  <mc:AlternateContent xmlns:mc="http://schemas.openxmlformats.org/markup-compatibility/2006" xmlns:p14="http://schemas.microsoft.com/office/powerpoint/2010/main">
+    <mc:Choice Requires="p14">
       <p:transition spd="slow" p14:dur="2000" advTm="11717"/>
     </mc:Choice>
-    <mc:Fallback>
+    <mc:Fallback xmlns="">
       <p:transition spd="slow" advTm="11717"/>
     </mc:Fallback>
   </mc:AlternateContent>

</xml_diff>